<commit_message>
Added Daily Rainfall project
</commit_message>
<xml_diff>
--- a/Housing Value Prediction/Group 13 BTP Presentation.pptx
+++ b/Housing Value Prediction/Group 13 BTP Presentation.pptx
@@ -39,10 +39,10 @@
     <p:sldId id="300" r:id="rId30"/>
     <p:sldId id="302" r:id="rId31"/>
     <p:sldId id="278" r:id="rId32"/>
-    <p:sldId id="284" r:id="rId33"/>
-    <p:sldId id="279" r:id="rId34"/>
-    <p:sldId id="304" r:id="rId35"/>
-    <p:sldId id="305" r:id="rId36"/>
+    <p:sldId id="279" r:id="rId33"/>
+    <p:sldId id="304" r:id="rId34"/>
+    <p:sldId id="305" r:id="rId35"/>
+    <p:sldId id="284" r:id="rId36"/>
     <p:sldId id="280" r:id="rId37"/>
     <p:sldId id="310" r:id="rId38"/>
     <p:sldId id="311" r:id="rId39"/>
@@ -193,10 +193,10 @@
             <p14:sldId id="300"/>
             <p14:sldId id="302"/>
             <p14:sldId id="278"/>
-            <p14:sldId id="284"/>
             <p14:sldId id="279"/>
             <p14:sldId id="304"/>
             <p14:sldId id="305"/>
+            <p14:sldId id="284"/>
             <p14:sldId id="280"/>
             <p14:sldId id="310"/>
             <p14:sldId id="311"/>
@@ -905,38 +905,6 @@
             <pc:docMk/>
             <pc:sldMk cId="1332291891" sldId="257"/>
             <ac:spMk id="5" creationId="{00000000-0000-0000-0000-000000000000}"/>
-          </ac:spMkLst>
-        </pc:spChg>
-      </pc:sldChg>
-    </pc:docChg>
-  </pc:docChgLst>
-  <pc:docChgLst>
-    <pc:chgData name="Guest User" providerId="Windows Live" clId="Web-{F4ECECA1-1234-4B39-8584-B6E3AAC90C4B}"/>
-    <pc:docChg chg="modSld">
-      <pc:chgData name="Guest User" userId="" providerId="Windows Live" clId="Web-{F4ECECA1-1234-4B39-8584-B6E3AAC90C4B}" dt="2018-05-11T10:42:52.388" v="483"/>
-      <pc:docMkLst>
-        <pc:docMk/>
-      </pc:docMkLst>
-      <pc:sldChg chg="modSp addAnim modAnim">
-        <pc:chgData name="Guest User" userId="" providerId="Windows Live" clId="Web-{F4ECECA1-1234-4B39-8584-B6E3AAC90C4B}" dt="2018-05-11T10:42:42.560" v="482"/>
-        <pc:sldMkLst>
-          <pc:docMk/>
-          <pc:sldMk cId="3529114326" sldId="268"/>
-        </pc:sldMkLst>
-        <pc:spChg chg="mod">
-          <ac:chgData name="Guest User" userId="" providerId="Windows Live" clId="Web-{F4ECECA1-1234-4B39-8584-B6E3AAC90C4B}" dt="2018-05-11T10:36:09.091" v="67" actId="20577"/>
-          <ac:spMkLst>
-            <pc:docMk/>
-            <pc:sldMk cId="3529114326" sldId="268"/>
-            <ac:spMk id="13" creationId="{00000000-0000-0000-0000-000000000000}"/>
-          </ac:spMkLst>
-        </pc:spChg>
-        <pc:spChg chg="mod">
-          <ac:chgData name="Guest User" userId="" providerId="Windows Live" clId="Web-{F4ECECA1-1234-4B39-8584-B6E3AAC90C4B}" dt="2018-05-11T10:42:25.012" v="479" actId="20577"/>
-          <ac:spMkLst>
-            <pc:docMk/>
-            <pc:sldMk cId="3529114326" sldId="268"/>
-            <ac:spMk id="14" creationId="{00000000-0000-0000-0000-000000000000}"/>
           </ac:spMkLst>
         </pc:spChg>
       </pc:sldChg>
@@ -1676,6 +1644,38 @@
     </pc:docChg>
   </pc:docChgLst>
   <pc:docChgLst>
+    <pc:chgData name="Guest User" providerId="Windows Live" clId="Web-{F4ECECA1-1234-4B39-8584-B6E3AAC90C4B}"/>
+    <pc:docChg chg="modSld">
+      <pc:chgData name="Guest User" userId="" providerId="Windows Live" clId="Web-{F4ECECA1-1234-4B39-8584-B6E3AAC90C4B}" dt="2018-05-11T10:42:52.388" v="483"/>
+      <pc:docMkLst>
+        <pc:docMk/>
+      </pc:docMkLst>
+      <pc:sldChg chg="modSp addAnim modAnim">
+        <pc:chgData name="Guest User" userId="" providerId="Windows Live" clId="Web-{F4ECECA1-1234-4B39-8584-B6E3AAC90C4B}" dt="2018-05-11T10:42:42.560" v="482"/>
+        <pc:sldMkLst>
+          <pc:docMk/>
+          <pc:sldMk cId="3529114326" sldId="268"/>
+        </pc:sldMkLst>
+        <pc:spChg chg="mod">
+          <ac:chgData name="Guest User" userId="" providerId="Windows Live" clId="Web-{F4ECECA1-1234-4B39-8584-B6E3AAC90C4B}" dt="2018-05-11T10:36:09.091" v="67" actId="20577"/>
+          <ac:spMkLst>
+            <pc:docMk/>
+            <pc:sldMk cId="3529114326" sldId="268"/>
+            <ac:spMk id="13" creationId="{00000000-0000-0000-0000-000000000000}"/>
+          </ac:spMkLst>
+        </pc:spChg>
+        <pc:spChg chg="mod">
+          <ac:chgData name="Guest User" userId="" providerId="Windows Live" clId="Web-{F4ECECA1-1234-4B39-8584-B6E3AAC90C4B}" dt="2018-05-11T10:42:25.012" v="479" actId="20577"/>
+          <ac:spMkLst>
+            <pc:docMk/>
+            <pc:sldMk cId="3529114326" sldId="268"/>
+            <ac:spMk id="14" creationId="{00000000-0000-0000-0000-000000000000}"/>
+          </ac:spMkLst>
+        </pc:spChg>
+      </pc:sldChg>
+    </pc:docChg>
+  </pc:docChgLst>
+  <pc:docChgLst>
     <pc:chgData name="devendra samatia" userId="bd4c2b84c1d61a8d" providerId="Windows Live" clId="Web-{76DD906A-A9D6-4157-9F55-5C0E9B8B3FB4}"/>
     <pc:docChg chg="modSld">
       <pc:chgData name="devendra samatia" userId="bd4c2b84c1d61a8d" providerId="Windows Live" clId="Web-{76DD906A-A9D6-4157-9F55-5C0E9B8B3FB4}" dt="2018-05-11T08:51:33.903" v="7" actId="20577"/>
@@ -1784,7 +1784,7 @@
           <a:p>
             <a:fld id="{FE5B4EDC-59C0-49C7-8ADA-5A781B329E02}" type="datetimeFigureOut">
               <a:rPr lang="en-US"/>
-              <a:t>5/14/2018</a:t>
+              <a:t>12/13/2018</a:t>
             </a:fld>
             <a:endParaRPr/>
           </a:p>
@@ -1949,7 +1949,7 @@
           <a:p>
             <a:fld id="{F2D8D46A-B586-417D-BFBD-8C8FE0AAF762}" type="datetimeFigureOut">
               <a:rPr lang="en-US"/>
-              <a:t>5/14/2018</a:t>
+              <a:t>12/13/2018</a:t>
             </a:fld>
             <a:endParaRPr/>
           </a:p>
@@ -2276,7 +2276,7 @@
           <a:p>
             <a:fld id="{3EBA5BD7-F043-4D1B-AA17-CD412FC534DE}" type="slidenum">
               <a:rPr lang="en-US" smtClean="0"/>
-              <a:t>45</a:t>
+              <a:t>46</a:t>
             </a:fld>
             <a:endParaRPr lang="en-US"/>
           </a:p>
@@ -3051,7 +3051,7 @@
           <a:p>
             <a:fld id="{F0DFD029-FB74-4578-B929-F66AA97659CA}" type="datetimeFigureOut">
               <a:rPr lang="en-US"/>
-              <a:t>5/14/2018</a:t>
+              <a:t>12/13/2018</a:t>
             </a:fld>
             <a:endParaRPr/>
           </a:p>
@@ -3249,7 +3249,7 @@
           <a:p>
             <a:fld id="{F0DFD029-FB74-4578-B929-F66AA97659CA}" type="datetimeFigureOut">
               <a:rPr lang="en-US"/>
-              <a:t>5/14/2018</a:t>
+              <a:t>12/13/2018</a:t>
             </a:fld>
             <a:endParaRPr/>
           </a:p>
@@ -3457,7 +3457,7 @@
           <a:p>
             <a:fld id="{F0DFD029-FB74-4578-B929-F66AA97659CA}" type="datetimeFigureOut">
               <a:rPr lang="en-US"/>
-              <a:t>5/14/2018</a:t>
+              <a:t>12/13/2018</a:t>
             </a:fld>
             <a:endParaRPr/>
           </a:p>
@@ -3655,7 +3655,7 @@
           <a:p>
             <a:fld id="{F0DFD029-FB74-4578-B929-F66AA97659CA}" type="datetimeFigureOut">
               <a:rPr lang="en-US"/>
-              <a:t>5/14/2018</a:t>
+              <a:t>12/13/2018</a:t>
             </a:fld>
             <a:endParaRPr/>
           </a:p>
@@ -4087,7 +4087,7 @@
           <a:p>
             <a:fld id="{F0DFD029-FB74-4578-B929-F66AA97659CA}" type="datetimeFigureOut">
               <a:rPr lang="en-US"/>
-              <a:t>5/14/2018</a:t>
+              <a:t>12/13/2018</a:t>
             </a:fld>
             <a:endParaRPr/>
           </a:p>
@@ -4391,7 +4391,7 @@
           <a:p>
             <a:fld id="{F0DFD029-FB74-4578-B929-F66AA97659CA}" type="datetimeFigureOut">
               <a:rPr lang="en-US"/>
-              <a:t>5/14/2018</a:t>
+              <a:t>12/13/2018</a:t>
             </a:fld>
             <a:endParaRPr/>
           </a:p>
@@ -4847,7 +4847,7 @@
           <a:p>
             <a:fld id="{F0DFD029-FB74-4578-B929-F66AA97659CA}" type="datetimeFigureOut">
               <a:rPr lang="en-US"/>
-              <a:t>5/14/2018</a:t>
+              <a:t>12/13/2018</a:t>
             </a:fld>
             <a:endParaRPr/>
           </a:p>
@@ -4977,7 +4977,7 @@
           <a:p>
             <a:fld id="{F0DFD029-FB74-4578-B929-F66AA97659CA}" type="datetimeFigureOut">
               <a:rPr lang="en-US"/>
-              <a:t>5/14/2018</a:t>
+              <a:t>12/13/2018</a:t>
             </a:fld>
             <a:endParaRPr/>
           </a:p>
@@ -5084,7 +5084,7 @@
           <a:p>
             <a:fld id="{F0DFD029-FB74-4578-B929-F66AA97659CA}" type="datetimeFigureOut">
               <a:rPr lang="en-US"/>
-              <a:t>5/14/2018</a:t>
+              <a:t>12/13/2018</a:t>
             </a:fld>
             <a:endParaRPr/>
           </a:p>
@@ -5383,7 +5383,7 @@
           <a:p>
             <a:fld id="{F0DFD029-FB74-4578-B929-F66AA97659CA}" type="datetimeFigureOut">
               <a:rPr lang="en-US"/>
-              <a:t>5/14/2018</a:t>
+              <a:t>12/13/2018</a:t>
             </a:fld>
             <a:endParaRPr/>
           </a:p>
@@ -5671,7 +5671,7 @@
           <a:p>
             <a:fld id="{F0DFD029-FB74-4578-B929-F66AA97659CA}" type="datetimeFigureOut">
               <a:rPr lang="en-US"/>
-              <a:t>5/14/2018</a:t>
+              <a:t>12/13/2018</a:t>
             </a:fld>
             <a:endParaRPr/>
           </a:p>
@@ -6294,7 +6294,7 @@
             <a:fld id="{F0DFD029-FB74-4578-B929-F66AA97659CA}" type="datetimeFigureOut">
               <a:rPr lang="en-US"/>
               <a:pPr/>
-              <a:t>5/14/2018</a:t>
+              <a:t>12/13/2018</a:t>
             </a:fld>
             <a:endParaRPr/>
           </a:p>
@@ -14773,7 +14773,7 @@
           <p:cNvPr id="2" name="Title 1">
             <a:extLst>
               <a:ext uri="{FF2B5EF4-FFF2-40B4-BE49-F238E27FC236}">
-                <a16:creationId xmlns:a16="http://schemas.microsoft.com/office/drawing/2014/main" id="{EBA51F80-A8F4-4EB5-9FC7-407D2AD1CB67}"/>
+                <a16:creationId xmlns:a16="http://schemas.microsoft.com/office/drawing/2014/main" id="{13546ABB-CCEE-4C97-9F86-8409A4669E95}"/>
               </a:ext>
             </a:extLst>
           </p:cNvPr>
@@ -14784,139 +14784,113 @@
             <p:ph type="title"/>
           </p:nvPr>
         </p:nvSpPr>
-        <p:spPr/>
+        <p:spPr>
+          <a:xfrm>
+            <a:off x="1218883" y="274637"/>
+            <a:ext cx="10360501" cy="1223963"/>
+          </a:xfrm>
+        </p:spPr>
         <p:txBody>
           <a:bodyPr/>
           <a:lstStyle/>
           <a:p>
             <a:r>
               <a:rPr lang="en-IN" dirty="0"/>
-              <a:t>Random Forest </a:t>
+              <a:t>Multi Layer Perceptron</a:t>
             </a:r>
           </a:p>
         </p:txBody>
       </p:sp>
       <p:sp>
         <p:nvSpPr>
-          <p:cNvPr id="3" name="Content Placeholder 2">
+          <p:cNvPr id="7" name="Title 1">
             <a:extLst>
               <a:ext uri="{FF2B5EF4-FFF2-40B4-BE49-F238E27FC236}">
-                <a16:creationId xmlns:a16="http://schemas.microsoft.com/office/drawing/2014/main" id="{3AB2CC37-AD51-49B7-884C-580796074B75}"/>
+                <a16:creationId xmlns:a16="http://schemas.microsoft.com/office/drawing/2014/main" id="{BB1DB737-15EA-49C7-99A9-84517D5525B8}"/>
               </a:ext>
             </a:extLst>
           </p:cNvPr>
-          <p:cNvSpPr>
-            <a:spLocks noGrp="1"/>
+          <p:cNvSpPr txBox="1">
+            <a:spLocks/>
           </p:cNvSpPr>
-          <p:nvPr>
-            <p:ph sz="half" idx="1"/>
-          </p:nvPr>
+          <p:nvPr/>
         </p:nvSpPr>
-        <p:spPr/>
-        <p:txBody>
-          <a:bodyPr>
-            <a:normAutofit/>
-          </a:bodyPr>
-          <a:lstStyle/>
-          <a:p>
-            <a:r>
-              <a:rPr lang="en-IN" sz="2000" dirty="0">
-                <a:latin typeface="Segoe UI" panose="020B0502040204020203" pitchFamily="34" charset="0"/>
-                <a:cs typeface="Segoe UI" panose="020B0502040204020203" pitchFamily="34" charset="0"/>
-              </a:rPr>
-              <a:t>The optimal result is obtained with parameters such as no of trees in the forest is19, splitting criteria as mean squared error, no of max features is 7, max depth of any tree is 5</a:t>
-            </a:r>
-            <a:br>
-              <a:rPr lang="en-IN" sz="2000" dirty="0">
-                <a:latin typeface="Segoe UI" panose="020B0502040204020203" pitchFamily="34" charset="0"/>
-                <a:cs typeface="Segoe UI" panose="020B0502040204020203" pitchFamily="34" charset="0"/>
-              </a:rPr>
-            </a:br>
-            <a:endParaRPr lang="en-US" sz="2000" b="1" i="1" dirty="0">
-              <a:latin typeface="Segoe UI" panose="020B0502040204020203" pitchFamily="34" charset="0"/>
-              <a:cs typeface="Segoe UI" panose="020B0502040204020203" pitchFamily="34" charset="0"/>
-            </a:endParaRPr>
-          </a:p>
-          <a:p>
-            <a:endParaRPr lang="en-IN" sz="2000" dirty="0"/>
-          </a:p>
-        </p:txBody>
-      </p:sp>
-      <p:pic>
-        <p:nvPicPr>
-          <p:cNvPr id="6" name="Content Placeholder 5" descr="A close up of a map&#10;&#10;Description generated with very high confidence">
-            <a:extLst>
-              <a:ext uri="{FF2B5EF4-FFF2-40B4-BE49-F238E27FC236}">
-                <a16:creationId xmlns:a16="http://schemas.microsoft.com/office/drawing/2014/main" id="{C1457448-777C-4847-A222-21727874E5FE}"/>
-              </a:ext>
-            </a:extLst>
-          </p:cNvPr>
-          <p:cNvPicPr>
-            <a:picLocks noGrp="1" noChangeAspect="1"/>
-          </p:cNvPicPr>
-          <p:nvPr>
-            <p:ph sz="half" idx="2"/>
-          </p:nvPr>
-        </p:nvPicPr>
-        <p:blipFill>
-          <a:blip r:embed="rId2" cstate="print">
-            <a:extLst>
-              <a:ext uri="{28A0092B-C50C-407E-A947-70E740481C1C}">
-                <a14:useLocalDpi xmlns:a14="http://schemas.microsoft.com/office/drawing/2010/main" val="0"/>
-              </a:ext>
-            </a:extLst>
-          </a:blip>
-          <a:stretch>
-            <a:fillRect/>
-          </a:stretch>
-        </p:blipFill>
         <p:spPr>
           <a:xfrm>
-            <a:off x="2097968" y="3501008"/>
-            <a:ext cx="4515521" cy="3010347"/>
-          </a:xfrm>
-        </p:spPr>
-      </p:pic>
-      <p:pic>
-        <p:nvPicPr>
-          <p:cNvPr id="8" name="Picture 7" descr="A screenshot of a cell phone screen with text&#10;&#10;Description generated with very high confidence">
-            <a:extLst>
-              <a:ext uri="{FF2B5EF4-FFF2-40B4-BE49-F238E27FC236}">
-                <a16:creationId xmlns:a16="http://schemas.microsoft.com/office/drawing/2014/main" id="{51022265-19D6-4906-8C87-C5C7404B1EE0}"/>
-              </a:ext>
-            </a:extLst>
-          </p:cNvPr>
-          <p:cNvPicPr>
-            <a:picLocks noChangeAspect="1"/>
-          </p:cNvPicPr>
-          <p:nvPr/>
-        </p:nvPicPr>
-        <p:blipFill>
-          <a:blip r:embed="rId3">
-            <a:extLst>
-              <a:ext uri="{28A0092B-C50C-407E-A947-70E740481C1C}">
-                <a14:useLocalDpi xmlns:a14="http://schemas.microsoft.com/office/drawing/2010/main" val="0"/>
-              </a:ext>
-            </a:extLst>
-          </a:blip>
-          <a:stretch>
-            <a:fillRect/>
-          </a:stretch>
-        </p:blipFill>
-        <p:spPr>
-          <a:xfrm>
-            <a:off x="7030516" y="448028"/>
-            <a:ext cx="4317131" cy="4286404"/>
+            <a:off x="1219959" y="1601757"/>
+            <a:ext cx="10360501" cy="4430114"/>
           </a:xfrm>
           <a:prstGeom prst="rect">
             <a:avLst/>
           </a:prstGeom>
         </p:spPr>
-      </p:pic>
+        <p:txBody>
+          <a:bodyPr vert="horz" lIns="121899" tIns="60949" rIns="121899" bIns="60949" rtlCol="0" anchor="b">
+            <a:normAutofit/>
+          </a:bodyPr>
+          <a:lstStyle>
+            <a:lvl1pPr algn="l" defTabSz="1218987" rtl="0" eaLnBrk="1" latinLnBrk="0" hangingPunct="1">
+              <a:lnSpc>
+                <a:spcPct val="90000"/>
+              </a:lnSpc>
+              <a:spcBef>
+                <a:spcPct val="0"/>
+              </a:spcBef>
+              <a:buNone/>
+              <a:defRPr sz="3600" kern="1200">
+                <a:solidFill>
+                  <a:schemeClr val="tx1"/>
+                </a:solidFill>
+                <a:latin typeface="+mj-lt"/>
+                <a:ea typeface="+mj-ea"/>
+                <a:cs typeface="+mj-cs"/>
+              </a:defRPr>
+            </a:lvl1pPr>
+          </a:lstStyle>
+          <a:p>
+            <a:r>
+              <a:rPr lang="en-IN" sz="2800" dirty="0">
+                <a:cs typeface="Calibri"/>
+              </a:rPr>
+              <a:t>Multi-layer perceptron is a type of artificial neural network which can be viewed as a type of logistic regression (where the dependent variable is categorical). </a:t>
+            </a:r>
+            <a:endParaRPr lang="en-IN" dirty="0">
+              <a:cs typeface="Calibri"/>
+            </a:endParaRPr>
+          </a:p>
+          <a:p>
+            <a:endParaRPr lang="en-IN" sz="2800" dirty="0">
+              <a:cs typeface="Calibri"/>
+            </a:endParaRPr>
+          </a:p>
+          <a:p>
+            <a:r>
+              <a:rPr lang="en-IN" sz="2800" dirty="0">
+                <a:cs typeface="Calibri"/>
+              </a:rPr>
+              <a:t>MLP uses supervised learning technique called Back-Propagation for training the artificial network. Here we used 3 hidden layers with 400, 100 and 10 nodes in the respective nodes.</a:t>
+            </a:r>
+          </a:p>
+          <a:p>
+            <a:endParaRPr lang="en-IN" sz="2800" dirty="0">
+              <a:cs typeface="Calibri"/>
+            </a:endParaRPr>
+          </a:p>
+          <a:p>
+            <a:r>
+              <a:rPr lang="en-IN" sz="2800" dirty="0">
+                <a:cs typeface="Calibri"/>
+              </a:rPr>
+              <a:t>It works by separating the data that are not linearly separable. It generates a function that acts as linear classifier. A perceptron produces an output on the basis of the inputs.</a:t>
+            </a:r>
+            <a:endParaRPr lang="en-IN" dirty="0"/>
+          </a:p>
+        </p:txBody>
+      </p:sp>
     </p:spTree>
     <p:extLst>
       <p:ext uri="{BB962C8B-B14F-4D97-AF65-F5344CB8AC3E}">
-        <p14:creationId xmlns:p14="http://schemas.microsoft.com/office/powerpoint/2010/main" val="2010872120"/>
+        <p14:creationId xmlns:p14="http://schemas.microsoft.com/office/powerpoint/2010/main" val="3382306718"/>
       </p:ext>
     </p:extLst>
   </p:cSld>
@@ -14969,9 +14943,107 @@
                                           </p:stCondLst>
                                         </p:cTn>
                                         <p:tgtEl>
-                                          <p:spTgt spid="3">
+                                          <p:spTgt spid="7">
                                             <p:txEl>
                                               <p:pRg st="0" end="0"/>
+                                            </p:txEl>
+                                          </p:spTgt>
+                                        </p:tgtEl>
+                                        <p:attrNameLst>
+                                          <p:attrName>style.visibility</p:attrName>
+                                        </p:attrNameLst>
+                                      </p:cBhvr>
+                                      <p:to>
+                                        <p:strVal val="visible"/>
+                                      </p:to>
+                                    </p:set>
+                                  </p:childTnLst>
+                                </p:cTn>
+                              </p:par>
+                            </p:childTnLst>
+                          </p:cTn>
+                        </p:par>
+                      </p:childTnLst>
+                    </p:cTn>
+                  </p:par>
+                  <p:par>
+                    <p:cTn id="7" fill="hold">
+                      <p:stCondLst>
+                        <p:cond delay="indefinite"/>
+                      </p:stCondLst>
+                      <p:childTnLst>
+                        <p:par>
+                          <p:cTn id="8" fill="hold">
+                            <p:stCondLst>
+                              <p:cond delay="0"/>
+                            </p:stCondLst>
+                            <p:childTnLst>
+                              <p:par>
+                                <p:cTn id="9" presetID="1" presetClass="entr" presetSubtype="0" fill="hold" grpId="0" nodeType="clickEffect">
+                                  <p:stCondLst>
+                                    <p:cond delay="0"/>
+                                  </p:stCondLst>
+                                  <p:childTnLst>
+                                    <p:set>
+                                      <p:cBhvr>
+                                        <p:cTn id="10" dur="1" fill="hold">
+                                          <p:stCondLst>
+                                            <p:cond delay="0"/>
+                                          </p:stCondLst>
+                                        </p:cTn>
+                                        <p:tgtEl>
+                                          <p:spTgt spid="7">
+                                            <p:txEl>
+                                              <p:pRg st="2" end="2"/>
+                                            </p:txEl>
+                                          </p:spTgt>
+                                        </p:tgtEl>
+                                        <p:attrNameLst>
+                                          <p:attrName>style.visibility</p:attrName>
+                                        </p:attrNameLst>
+                                      </p:cBhvr>
+                                      <p:to>
+                                        <p:strVal val="visible"/>
+                                      </p:to>
+                                    </p:set>
+                                  </p:childTnLst>
+                                </p:cTn>
+                              </p:par>
+                            </p:childTnLst>
+                          </p:cTn>
+                        </p:par>
+                      </p:childTnLst>
+                    </p:cTn>
+                  </p:par>
+                  <p:par>
+                    <p:cTn id="11" fill="hold">
+                      <p:stCondLst>
+                        <p:cond delay="indefinite"/>
+                      </p:stCondLst>
+                      <p:childTnLst>
+                        <p:par>
+                          <p:cTn id="12" fill="hold">
+                            <p:stCondLst>
+                              <p:cond delay="0"/>
+                            </p:stCondLst>
+                            <p:childTnLst>
+                              <p:par>
+                                <p:cTn id="13" presetID="1" presetClass="entr" presetSubtype="0" fill="hold" grpId="0" nodeType="clickEffect">
+                                  <p:stCondLst>
+                                    <p:cond delay="0"/>
+                                  </p:stCondLst>
+                                  <p:childTnLst>
+                                    <p:set>
+                                      <p:cBhvr>
+                                        <p:cTn id="14" dur="1" fill="hold">
+                                          <p:stCondLst>
+                                            <p:cond delay="0"/>
+                                          </p:stCondLst>
+                                        </p:cTn>
+                                        <p:tgtEl>
+                                          <p:spTgt spid="7">
+                                            <p:txEl>
+                                              <p:pRg st="4" end="4"/>
                                             </p:txEl>
                                           </p:spTgt>
                                         </p:tgtEl>
@@ -15014,7 +15086,7 @@
       </p:par>
     </p:tnLst>
     <p:bldLst>
-      <p:bldP spid="3" grpId="0" build="p"/>
+      <p:bldP spid="7" grpId="0" build="p"/>
     </p:bldLst>
   </p:timing>
 </p:sld>
@@ -15360,347 +15432,6 @@
           </a:p>
         </p:txBody>
       </p:sp>
-      <p:sp>
-        <p:nvSpPr>
-          <p:cNvPr id="7" name="Title 1">
-            <a:extLst>
-              <a:ext uri="{FF2B5EF4-FFF2-40B4-BE49-F238E27FC236}">
-                <a16:creationId xmlns:a16="http://schemas.microsoft.com/office/drawing/2014/main" id="{BB1DB737-15EA-49C7-99A9-84517D5525B8}"/>
-              </a:ext>
-            </a:extLst>
-          </p:cNvPr>
-          <p:cNvSpPr txBox="1">
-            <a:spLocks/>
-          </p:cNvSpPr>
-          <p:nvPr/>
-        </p:nvSpPr>
-        <p:spPr>
-          <a:xfrm>
-            <a:off x="1219959" y="1601757"/>
-            <a:ext cx="10360501" cy="4430114"/>
-          </a:xfrm>
-          <a:prstGeom prst="rect">
-            <a:avLst/>
-          </a:prstGeom>
-        </p:spPr>
-        <p:txBody>
-          <a:bodyPr vert="horz" lIns="121899" tIns="60949" rIns="121899" bIns="60949" rtlCol="0" anchor="b">
-            <a:normAutofit/>
-          </a:bodyPr>
-          <a:lstStyle>
-            <a:lvl1pPr algn="l" defTabSz="1218987" rtl="0" eaLnBrk="1" latinLnBrk="0" hangingPunct="1">
-              <a:lnSpc>
-                <a:spcPct val="90000"/>
-              </a:lnSpc>
-              <a:spcBef>
-                <a:spcPct val="0"/>
-              </a:spcBef>
-              <a:buNone/>
-              <a:defRPr sz="3600" kern="1200">
-                <a:solidFill>
-                  <a:schemeClr val="tx1"/>
-                </a:solidFill>
-                <a:latin typeface="+mj-lt"/>
-                <a:ea typeface="+mj-ea"/>
-                <a:cs typeface="+mj-cs"/>
-              </a:defRPr>
-            </a:lvl1pPr>
-          </a:lstStyle>
-          <a:p>
-            <a:r>
-              <a:rPr lang="en-IN" sz="2800" dirty="0">
-                <a:cs typeface="Calibri"/>
-              </a:rPr>
-              <a:t>Multi-layer perceptron is a type of artificial neural network which can be viewed as a type of logistic regression (where the dependent variable is categorical). </a:t>
-            </a:r>
-            <a:endParaRPr lang="en-IN" dirty="0">
-              <a:cs typeface="Calibri"/>
-            </a:endParaRPr>
-          </a:p>
-          <a:p>
-            <a:endParaRPr lang="en-IN" sz="2800" dirty="0">
-              <a:cs typeface="Calibri"/>
-            </a:endParaRPr>
-          </a:p>
-          <a:p>
-            <a:r>
-              <a:rPr lang="en-IN" sz="2800" dirty="0">
-                <a:cs typeface="Calibri"/>
-              </a:rPr>
-              <a:t>MLP uses supervised learning technique called Back-Propagation for training the artificial network. Here we used 3 hidden layers with 400, 100 and 10 nodes in the respective nodes.</a:t>
-            </a:r>
-          </a:p>
-          <a:p>
-            <a:endParaRPr lang="en-IN" sz="2800" dirty="0">
-              <a:cs typeface="Calibri"/>
-            </a:endParaRPr>
-          </a:p>
-          <a:p>
-            <a:r>
-              <a:rPr lang="en-IN" sz="2800" dirty="0">
-                <a:cs typeface="Calibri"/>
-              </a:rPr>
-              <a:t>It works by separating the data that are not linearly separable. It generates a function that acts as linear classifier. A perceptron produces an output on the basis of the inputs.</a:t>
-            </a:r>
-            <a:endParaRPr lang="en-IN" dirty="0"/>
-          </a:p>
-        </p:txBody>
-      </p:sp>
-    </p:spTree>
-    <p:extLst>
-      <p:ext uri="{BB962C8B-B14F-4D97-AF65-F5344CB8AC3E}">
-        <p14:creationId xmlns:p14="http://schemas.microsoft.com/office/powerpoint/2010/main" val="3382306718"/>
-      </p:ext>
-    </p:extLst>
-  </p:cSld>
-  <p:clrMapOvr>
-    <a:masterClrMapping/>
-  </p:clrMapOvr>
-  <mc:AlternateContent xmlns:mc="http://schemas.openxmlformats.org/markup-compatibility/2006" xmlns:p14="http://schemas.microsoft.com/office/powerpoint/2010/main">
-    <mc:Choice Requires="p14">
-      <p:transition spd="med" p14:dur="700">
-        <p:fade/>
-      </p:transition>
-    </mc:Choice>
-    <mc:Fallback xmlns="">
-      <p:transition spd="med">
-        <p:fade/>
-      </p:transition>
-    </mc:Fallback>
-  </mc:AlternateContent>
-  <p:timing>
-    <p:tnLst>
-      <p:par>
-        <p:cTn id="1" dur="indefinite" restart="never" nodeType="tmRoot">
-          <p:childTnLst>
-            <p:seq concurrent="1" nextAc="seek">
-              <p:cTn id="2" dur="indefinite" nodeType="mainSeq">
-                <p:childTnLst>
-                  <p:par>
-                    <p:cTn id="3" fill="hold">
-                      <p:stCondLst>
-                        <p:cond delay="indefinite"/>
-                      </p:stCondLst>
-                      <p:childTnLst>
-                        <p:par>
-                          <p:cTn id="4" fill="hold">
-                            <p:stCondLst>
-                              <p:cond delay="0"/>
-                            </p:stCondLst>
-                            <p:childTnLst>
-                              <p:par>
-                                <p:cTn id="5" presetID="1" presetClass="entr" presetSubtype="0" fill="hold" grpId="0" nodeType="clickEffect">
-                                  <p:stCondLst>
-                                    <p:cond delay="0"/>
-                                  </p:stCondLst>
-                                  <p:childTnLst>
-                                    <p:set>
-                                      <p:cBhvr>
-                                        <p:cTn id="6" dur="1" fill="hold">
-                                          <p:stCondLst>
-                                            <p:cond delay="0"/>
-                                          </p:stCondLst>
-                                        </p:cTn>
-                                        <p:tgtEl>
-                                          <p:spTgt spid="7">
-                                            <p:txEl>
-                                              <p:pRg st="0" end="0"/>
-                                            </p:txEl>
-                                          </p:spTgt>
-                                        </p:tgtEl>
-                                        <p:attrNameLst>
-                                          <p:attrName>style.visibility</p:attrName>
-                                        </p:attrNameLst>
-                                      </p:cBhvr>
-                                      <p:to>
-                                        <p:strVal val="visible"/>
-                                      </p:to>
-                                    </p:set>
-                                  </p:childTnLst>
-                                </p:cTn>
-                              </p:par>
-                            </p:childTnLst>
-                          </p:cTn>
-                        </p:par>
-                      </p:childTnLst>
-                    </p:cTn>
-                  </p:par>
-                  <p:par>
-                    <p:cTn id="7" fill="hold">
-                      <p:stCondLst>
-                        <p:cond delay="indefinite"/>
-                      </p:stCondLst>
-                      <p:childTnLst>
-                        <p:par>
-                          <p:cTn id="8" fill="hold">
-                            <p:stCondLst>
-                              <p:cond delay="0"/>
-                            </p:stCondLst>
-                            <p:childTnLst>
-                              <p:par>
-                                <p:cTn id="9" presetID="1" presetClass="entr" presetSubtype="0" fill="hold" grpId="0" nodeType="clickEffect">
-                                  <p:stCondLst>
-                                    <p:cond delay="0"/>
-                                  </p:stCondLst>
-                                  <p:childTnLst>
-                                    <p:set>
-                                      <p:cBhvr>
-                                        <p:cTn id="10" dur="1" fill="hold">
-                                          <p:stCondLst>
-                                            <p:cond delay="0"/>
-                                          </p:stCondLst>
-                                        </p:cTn>
-                                        <p:tgtEl>
-                                          <p:spTgt spid="7">
-                                            <p:txEl>
-                                              <p:pRg st="2" end="2"/>
-                                            </p:txEl>
-                                          </p:spTgt>
-                                        </p:tgtEl>
-                                        <p:attrNameLst>
-                                          <p:attrName>style.visibility</p:attrName>
-                                        </p:attrNameLst>
-                                      </p:cBhvr>
-                                      <p:to>
-                                        <p:strVal val="visible"/>
-                                      </p:to>
-                                    </p:set>
-                                  </p:childTnLst>
-                                </p:cTn>
-                              </p:par>
-                            </p:childTnLst>
-                          </p:cTn>
-                        </p:par>
-                      </p:childTnLst>
-                    </p:cTn>
-                  </p:par>
-                  <p:par>
-                    <p:cTn id="11" fill="hold">
-                      <p:stCondLst>
-                        <p:cond delay="indefinite"/>
-                      </p:stCondLst>
-                      <p:childTnLst>
-                        <p:par>
-                          <p:cTn id="12" fill="hold">
-                            <p:stCondLst>
-                              <p:cond delay="0"/>
-                            </p:stCondLst>
-                            <p:childTnLst>
-                              <p:par>
-                                <p:cTn id="13" presetID="1" presetClass="entr" presetSubtype="0" fill="hold" grpId="0" nodeType="clickEffect">
-                                  <p:stCondLst>
-                                    <p:cond delay="0"/>
-                                  </p:stCondLst>
-                                  <p:childTnLst>
-                                    <p:set>
-                                      <p:cBhvr>
-                                        <p:cTn id="14" dur="1" fill="hold">
-                                          <p:stCondLst>
-                                            <p:cond delay="0"/>
-                                          </p:stCondLst>
-                                        </p:cTn>
-                                        <p:tgtEl>
-                                          <p:spTgt spid="7">
-                                            <p:txEl>
-                                              <p:pRg st="4" end="4"/>
-                                            </p:txEl>
-                                          </p:spTgt>
-                                        </p:tgtEl>
-                                        <p:attrNameLst>
-                                          <p:attrName>style.visibility</p:attrName>
-                                        </p:attrNameLst>
-                                      </p:cBhvr>
-                                      <p:to>
-                                        <p:strVal val="visible"/>
-                                      </p:to>
-                                    </p:set>
-                                  </p:childTnLst>
-                                </p:cTn>
-                              </p:par>
-                            </p:childTnLst>
-                          </p:cTn>
-                        </p:par>
-                      </p:childTnLst>
-                    </p:cTn>
-                  </p:par>
-                </p:childTnLst>
-              </p:cTn>
-              <p:prevCondLst>
-                <p:cond evt="onPrev" delay="0">
-                  <p:tgtEl>
-                    <p:sldTgt/>
-                  </p:tgtEl>
-                </p:cond>
-              </p:prevCondLst>
-              <p:nextCondLst>
-                <p:cond evt="onNext" delay="0">
-                  <p:tgtEl>
-                    <p:sldTgt/>
-                  </p:tgtEl>
-                </p:cond>
-              </p:nextCondLst>
-            </p:seq>
-          </p:childTnLst>
-        </p:cTn>
-      </p:par>
-    </p:tnLst>
-    <p:bldLst>
-      <p:bldP spid="7" grpId="0" build="p"/>
-    </p:bldLst>
-  </p:timing>
-</p:sld>
-</file>
-
-<file path=ppt/slides/slide31.xml><?xml version="1.0" encoding="utf-8"?>
-<p:sld xmlns:a="http://schemas.openxmlformats.org/drawingml/2006/main" xmlns:r="http://schemas.openxmlformats.org/officeDocument/2006/relationships" xmlns:p="http://schemas.openxmlformats.org/presentationml/2006/main">
-  <p:cSld>
-    <p:spTree>
-      <p:nvGrpSpPr>
-        <p:cNvPr id="1" name=""/>
-        <p:cNvGrpSpPr/>
-        <p:nvPr/>
-      </p:nvGrpSpPr>
-      <p:grpSpPr>
-        <a:xfrm>
-          <a:off x="0" y="0"/>
-          <a:ext cx="0" cy="0"/>
-          <a:chOff x="0" y="0"/>
-          <a:chExt cx="0" cy="0"/>
-        </a:xfrm>
-      </p:grpSpPr>
-      <p:sp>
-        <p:nvSpPr>
-          <p:cNvPr id="2" name="Title 1">
-            <a:extLst>
-              <a:ext uri="{FF2B5EF4-FFF2-40B4-BE49-F238E27FC236}">
-                <a16:creationId xmlns:a16="http://schemas.microsoft.com/office/drawing/2014/main" id="{13546ABB-CCEE-4C97-9F86-8409A4669E95}"/>
-              </a:ext>
-            </a:extLst>
-          </p:cNvPr>
-          <p:cNvSpPr>
-            <a:spLocks noGrp="1"/>
-          </p:cNvSpPr>
-          <p:nvPr>
-            <p:ph type="title"/>
-          </p:nvPr>
-        </p:nvSpPr>
-        <p:spPr>
-          <a:xfrm>
-            <a:off x="1218883" y="274637"/>
-            <a:ext cx="10360501" cy="1223963"/>
-          </a:xfrm>
-        </p:spPr>
-        <p:txBody>
-          <a:bodyPr/>
-          <a:lstStyle/>
-          <a:p>
-            <a:r>
-              <a:rPr lang="en-IN" dirty="0"/>
-              <a:t>Multi Layer Perceptron</a:t>
-            </a:r>
-          </a:p>
-        </p:txBody>
-      </p:sp>
       <p:pic>
         <p:nvPicPr>
           <p:cNvPr id="3" name="Picture 3" descr="A close up of a logo&#10;&#10;Description generated with very high confidence">
@@ -15815,7 +15546,7 @@
 </p:sld>
 </file>
 
-<file path=ppt/slides/slide32.xml><?xml version="1.0" encoding="utf-8"?>
+<file path=ppt/slides/slide31.xml><?xml version="1.0" encoding="utf-8"?>
 <p:sld xmlns:a="http://schemas.openxmlformats.org/drawingml/2006/main" xmlns:r="http://schemas.openxmlformats.org/officeDocument/2006/relationships" xmlns:p="http://schemas.openxmlformats.org/presentationml/2006/main">
   <p:cSld>
     <p:spTree>
@@ -16009,6 +15740,275 @@
     </p:tnLst>
     <p:bldLst>
       <p:bldP spid="5" grpId="0"/>
+    </p:bldLst>
+  </p:timing>
+</p:sld>
+</file>
+
+<file path=ppt/slides/slide32.xml><?xml version="1.0" encoding="utf-8"?>
+<p:sld xmlns:a="http://schemas.openxmlformats.org/drawingml/2006/main" xmlns:r="http://schemas.openxmlformats.org/officeDocument/2006/relationships" xmlns:p="http://schemas.openxmlformats.org/presentationml/2006/main">
+  <p:cSld>
+    <p:spTree>
+      <p:nvGrpSpPr>
+        <p:cNvPr id="1" name=""/>
+        <p:cNvGrpSpPr/>
+        <p:nvPr/>
+      </p:nvGrpSpPr>
+      <p:grpSpPr>
+        <a:xfrm>
+          <a:off x="0" y="0"/>
+          <a:ext cx="0" cy="0"/>
+          <a:chOff x="0" y="0"/>
+          <a:chExt cx="0" cy="0"/>
+        </a:xfrm>
+      </p:grpSpPr>
+      <p:sp>
+        <p:nvSpPr>
+          <p:cNvPr id="2" name="Title 1">
+            <a:extLst>
+              <a:ext uri="{FF2B5EF4-FFF2-40B4-BE49-F238E27FC236}">
+                <a16:creationId xmlns:a16="http://schemas.microsoft.com/office/drawing/2014/main" id="{EBA51F80-A8F4-4EB5-9FC7-407D2AD1CB67}"/>
+              </a:ext>
+            </a:extLst>
+          </p:cNvPr>
+          <p:cNvSpPr>
+            <a:spLocks noGrp="1"/>
+          </p:cNvSpPr>
+          <p:nvPr>
+            <p:ph type="title"/>
+          </p:nvPr>
+        </p:nvSpPr>
+        <p:spPr/>
+        <p:txBody>
+          <a:bodyPr/>
+          <a:lstStyle/>
+          <a:p>
+            <a:r>
+              <a:rPr lang="en-IN" dirty="0"/>
+              <a:t>Random Forest </a:t>
+            </a:r>
+          </a:p>
+        </p:txBody>
+      </p:sp>
+      <p:sp>
+        <p:nvSpPr>
+          <p:cNvPr id="3" name="Content Placeholder 2">
+            <a:extLst>
+              <a:ext uri="{FF2B5EF4-FFF2-40B4-BE49-F238E27FC236}">
+                <a16:creationId xmlns:a16="http://schemas.microsoft.com/office/drawing/2014/main" id="{3AB2CC37-AD51-49B7-884C-580796074B75}"/>
+              </a:ext>
+            </a:extLst>
+          </p:cNvPr>
+          <p:cNvSpPr>
+            <a:spLocks noGrp="1"/>
+          </p:cNvSpPr>
+          <p:nvPr>
+            <p:ph sz="half" idx="1"/>
+          </p:nvPr>
+        </p:nvSpPr>
+        <p:spPr/>
+        <p:txBody>
+          <a:bodyPr>
+            <a:normAutofit/>
+          </a:bodyPr>
+          <a:lstStyle/>
+          <a:p>
+            <a:r>
+              <a:rPr lang="en-IN" sz="2000" dirty="0">
+                <a:latin typeface="Segoe UI" panose="020B0502040204020203" pitchFamily="34" charset="0"/>
+                <a:cs typeface="Segoe UI" panose="020B0502040204020203" pitchFamily="34" charset="0"/>
+              </a:rPr>
+              <a:t>The optimal result is obtained with parameters such as no of trees in the forest is19, splitting criteria as mean squared error, no of max features is 7, max depth of any tree is 5</a:t>
+            </a:r>
+            <a:br>
+              <a:rPr lang="en-IN" sz="2000" dirty="0">
+                <a:latin typeface="Segoe UI" panose="020B0502040204020203" pitchFamily="34" charset="0"/>
+                <a:cs typeface="Segoe UI" panose="020B0502040204020203" pitchFamily="34" charset="0"/>
+              </a:rPr>
+            </a:br>
+            <a:endParaRPr lang="en-US" sz="2000" b="1" i="1" dirty="0">
+              <a:latin typeface="Segoe UI" panose="020B0502040204020203" pitchFamily="34" charset="0"/>
+              <a:cs typeface="Segoe UI" panose="020B0502040204020203" pitchFamily="34" charset="0"/>
+            </a:endParaRPr>
+          </a:p>
+          <a:p>
+            <a:endParaRPr lang="en-IN" sz="2000" dirty="0"/>
+          </a:p>
+        </p:txBody>
+      </p:sp>
+      <p:pic>
+        <p:nvPicPr>
+          <p:cNvPr id="6" name="Content Placeholder 5" descr="A close up of a map&#10;&#10;Description generated with very high confidence">
+            <a:extLst>
+              <a:ext uri="{FF2B5EF4-FFF2-40B4-BE49-F238E27FC236}">
+                <a16:creationId xmlns:a16="http://schemas.microsoft.com/office/drawing/2014/main" id="{C1457448-777C-4847-A222-21727874E5FE}"/>
+              </a:ext>
+            </a:extLst>
+          </p:cNvPr>
+          <p:cNvPicPr>
+            <a:picLocks noGrp="1" noChangeAspect="1"/>
+          </p:cNvPicPr>
+          <p:nvPr>
+            <p:ph sz="half" idx="2"/>
+          </p:nvPr>
+        </p:nvPicPr>
+        <p:blipFill>
+          <a:blip r:embed="rId2" cstate="print">
+            <a:extLst>
+              <a:ext uri="{28A0092B-C50C-407E-A947-70E740481C1C}">
+                <a14:useLocalDpi xmlns:a14="http://schemas.microsoft.com/office/drawing/2010/main" val="0"/>
+              </a:ext>
+            </a:extLst>
+          </a:blip>
+          <a:stretch>
+            <a:fillRect/>
+          </a:stretch>
+        </p:blipFill>
+        <p:spPr>
+          <a:xfrm>
+            <a:off x="2097968" y="3501008"/>
+            <a:ext cx="4515521" cy="3010347"/>
+          </a:xfrm>
+        </p:spPr>
+      </p:pic>
+      <p:pic>
+        <p:nvPicPr>
+          <p:cNvPr id="8" name="Picture 7" descr="A screenshot of a cell phone screen with text&#10;&#10;Description generated with very high confidence">
+            <a:extLst>
+              <a:ext uri="{FF2B5EF4-FFF2-40B4-BE49-F238E27FC236}">
+                <a16:creationId xmlns:a16="http://schemas.microsoft.com/office/drawing/2014/main" id="{51022265-19D6-4906-8C87-C5C7404B1EE0}"/>
+              </a:ext>
+            </a:extLst>
+          </p:cNvPr>
+          <p:cNvPicPr>
+            <a:picLocks noChangeAspect="1"/>
+          </p:cNvPicPr>
+          <p:nvPr/>
+        </p:nvPicPr>
+        <p:blipFill>
+          <a:blip r:embed="rId3">
+            <a:extLst>
+              <a:ext uri="{28A0092B-C50C-407E-A947-70E740481C1C}">
+                <a14:useLocalDpi xmlns:a14="http://schemas.microsoft.com/office/drawing/2010/main" val="0"/>
+              </a:ext>
+            </a:extLst>
+          </a:blip>
+          <a:stretch>
+            <a:fillRect/>
+          </a:stretch>
+        </p:blipFill>
+        <p:spPr>
+          <a:xfrm>
+            <a:off x="7030516" y="448028"/>
+            <a:ext cx="4317131" cy="4286404"/>
+          </a:xfrm>
+          <a:prstGeom prst="rect">
+            <a:avLst/>
+          </a:prstGeom>
+        </p:spPr>
+      </p:pic>
+    </p:spTree>
+    <p:extLst>
+      <p:ext uri="{BB962C8B-B14F-4D97-AF65-F5344CB8AC3E}">
+        <p14:creationId xmlns:p14="http://schemas.microsoft.com/office/powerpoint/2010/main" val="2010872120"/>
+      </p:ext>
+    </p:extLst>
+  </p:cSld>
+  <p:clrMapOvr>
+    <a:masterClrMapping/>
+  </p:clrMapOvr>
+  <mc:AlternateContent xmlns:mc="http://schemas.openxmlformats.org/markup-compatibility/2006" xmlns:p14="http://schemas.microsoft.com/office/powerpoint/2010/main">
+    <mc:Choice Requires="p14">
+      <p:transition spd="med" p14:dur="700">
+        <p:fade/>
+      </p:transition>
+    </mc:Choice>
+    <mc:Fallback xmlns="">
+      <p:transition spd="med">
+        <p:fade/>
+      </p:transition>
+    </mc:Fallback>
+  </mc:AlternateContent>
+  <p:timing>
+    <p:tnLst>
+      <p:par>
+        <p:cTn id="1" dur="indefinite" restart="never" nodeType="tmRoot">
+          <p:childTnLst>
+            <p:seq concurrent="1" nextAc="seek">
+              <p:cTn id="2" dur="indefinite" nodeType="mainSeq">
+                <p:childTnLst>
+                  <p:par>
+                    <p:cTn id="3" fill="hold">
+                      <p:stCondLst>
+                        <p:cond delay="indefinite"/>
+                      </p:stCondLst>
+                      <p:childTnLst>
+                        <p:par>
+                          <p:cTn id="4" fill="hold">
+                            <p:stCondLst>
+                              <p:cond delay="0"/>
+                            </p:stCondLst>
+                            <p:childTnLst>
+                              <p:par>
+                                <p:cTn id="5" presetID="1" presetClass="entr" presetSubtype="0" fill="hold" grpId="0" nodeType="clickEffect">
+                                  <p:stCondLst>
+                                    <p:cond delay="0"/>
+                                  </p:stCondLst>
+                                  <p:childTnLst>
+                                    <p:set>
+                                      <p:cBhvr>
+                                        <p:cTn id="6" dur="1" fill="hold">
+                                          <p:stCondLst>
+                                            <p:cond delay="0"/>
+                                          </p:stCondLst>
+                                        </p:cTn>
+                                        <p:tgtEl>
+                                          <p:spTgt spid="3">
+                                            <p:txEl>
+                                              <p:pRg st="0" end="0"/>
+                                            </p:txEl>
+                                          </p:spTgt>
+                                        </p:tgtEl>
+                                        <p:attrNameLst>
+                                          <p:attrName>style.visibility</p:attrName>
+                                        </p:attrNameLst>
+                                      </p:cBhvr>
+                                      <p:to>
+                                        <p:strVal val="visible"/>
+                                      </p:to>
+                                    </p:set>
+                                  </p:childTnLst>
+                                </p:cTn>
+                              </p:par>
+                            </p:childTnLst>
+                          </p:cTn>
+                        </p:par>
+                      </p:childTnLst>
+                    </p:cTn>
+                  </p:par>
+                </p:childTnLst>
+              </p:cTn>
+              <p:prevCondLst>
+                <p:cond evt="onPrev" delay="0">
+                  <p:tgtEl>
+                    <p:sldTgt/>
+                  </p:tgtEl>
+                </p:cond>
+              </p:prevCondLst>
+              <p:nextCondLst>
+                <p:cond evt="onNext" delay="0">
+                  <p:tgtEl>
+                    <p:sldTgt/>
+                  </p:tgtEl>
+                </p:cond>
+              </p:nextCondLst>
+            </p:seq>
+          </p:childTnLst>
+        </p:cTn>
+      </p:par>
+    </p:tnLst>
+    <p:bldLst>
+      <p:bldP spid="3" grpId="0" build="p"/>
     </p:bldLst>
   </p:timing>
 </p:sld>
@@ -17163,7 +17163,7 @@
           <p:nvPr/>
         </p:nvPicPr>
         <p:blipFill>
-          <a:blip r:embed="rId2">
+          <a:blip r:embed="rId2" cstate="print">
             <a:extLst>
               <a:ext uri="{28A0092B-C50C-407E-A947-70E740481C1C}">
                 <a14:useLocalDpi xmlns:a14="http://schemas.microsoft.com/office/drawing/2010/main" val="0"/>
@@ -17269,7 +17269,7 @@
           <p:nvPr/>
         </p:nvPicPr>
         <p:blipFill>
-          <a:blip r:embed="rId2">
+          <a:blip r:embed="rId2" cstate="print">
             <a:extLst>
               <a:ext uri="{28A0092B-C50C-407E-A947-70E740481C1C}">
                 <a14:useLocalDpi xmlns:a14="http://schemas.microsoft.com/office/drawing/2010/main" val="0"/>
@@ -17305,7 +17305,7 @@
           <p:nvPr/>
         </p:nvPicPr>
         <p:blipFill>
-          <a:blip r:embed="rId2">
+          <a:blip r:embed="rId2" cstate="print">
             <a:extLst>
               <a:ext uri="{28A0092B-C50C-407E-A947-70E740481C1C}">
                 <a14:useLocalDpi xmlns:a14="http://schemas.microsoft.com/office/drawing/2010/main" val="0"/>
@@ -17411,7 +17411,7 @@
           <p:nvPr/>
         </p:nvPicPr>
         <p:blipFill>
-          <a:blip r:embed="rId2">
+          <a:blip r:embed="rId2" cstate="print">
             <a:extLst>
               <a:ext uri="{28A0092B-C50C-407E-A947-70E740481C1C}">
                 <a14:useLocalDpi xmlns:a14="http://schemas.microsoft.com/office/drawing/2010/main" val="0"/>
@@ -17517,7 +17517,7 @@
           <p:nvPr/>
         </p:nvPicPr>
         <p:blipFill>
-          <a:blip r:embed="rId2">
+          <a:blip r:embed="rId2" cstate="print">
             <a:extLst>
               <a:ext uri="{28A0092B-C50C-407E-A947-70E740481C1C}">
                 <a14:useLocalDpi xmlns:a14="http://schemas.microsoft.com/office/drawing/2010/main" val="0"/>
@@ -17623,7 +17623,7 @@
           <p:nvPr/>
         </p:nvPicPr>
         <p:blipFill>
-          <a:blip r:embed="rId2">
+          <a:blip r:embed="rId2" cstate="print">
             <a:extLst>
               <a:ext uri="{28A0092B-C50C-407E-A947-70E740481C1C}">
                 <a14:useLocalDpi xmlns:a14="http://schemas.microsoft.com/office/drawing/2010/main" val="0"/>
@@ -17729,7 +17729,7 @@
           <p:nvPr/>
         </p:nvPicPr>
         <p:blipFill>
-          <a:blip r:embed="rId2">
+          <a:blip r:embed="rId2" cstate="print">
             <a:extLst>
               <a:ext uri="{28A0092B-C50C-407E-A947-70E740481C1C}">
                 <a14:useLocalDpi xmlns:a14="http://schemas.microsoft.com/office/drawing/2010/main" val="0"/>
@@ -18133,7 +18133,7 @@
           <p:nvPr/>
         </p:nvPicPr>
         <p:blipFill>
-          <a:blip r:embed="rId2">
+          <a:blip r:embed="rId2" cstate="print">
             <a:extLst>
               <a:ext uri="{28A0092B-C50C-407E-A947-70E740481C1C}">
                 <a14:useLocalDpi xmlns:a14="http://schemas.microsoft.com/office/drawing/2010/main" val="0"/>
@@ -18239,7 +18239,7 @@
           <p:nvPr/>
         </p:nvPicPr>
         <p:blipFill>
-          <a:blip r:embed="rId2">
+          <a:blip r:embed="rId2" cstate="print">
             <a:extLst>
               <a:ext uri="{28A0092B-C50C-407E-A947-70E740481C1C}">
                 <a14:useLocalDpi xmlns:a14="http://schemas.microsoft.com/office/drawing/2010/main" val="0"/>
@@ -21442,7 +21442,7 @@
                             </p:stCondLst>
                             <p:childTnLst>
                               <p:par>
-                                <p:cTn id="5" presetID="1" presetClass="entr" presetSubtype="0" fill="hold" grpId="0" nodeType="clickEffect">
+                                <p:cTn id="5" presetID="1" presetClass="entr" presetSubtype="0" fill="hold" nodeType="clickEffect">
                                   <p:stCondLst>
                                     <p:cond delay="0"/>
                                   </p:stCondLst>
@@ -21491,7 +21491,7 @@
                             </p:stCondLst>
                             <p:childTnLst>
                               <p:par>
-                                <p:cTn id="9" presetID="1" presetClass="entr" presetSubtype="0" fill="hold" grpId="0" nodeType="clickEffect">
+                                <p:cTn id="9" presetID="1" presetClass="entr" presetSubtype="0" fill="hold" nodeType="clickEffect">
                                   <p:stCondLst>
                                     <p:cond delay="0"/>
                                   </p:stCondLst>
@@ -21540,7 +21540,7 @@
                             </p:stCondLst>
                             <p:childTnLst>
                               <p:par>
-                                <p:cTn id="13" presetID="1" presetClass="entr" presetSubtype="0" fill="hold" grpId="0" nodeType="clickEffect">
+                                <p:cTn id="13" presetID="1" presetClass="entr" presetSubtype="0" fill="hold" nodeType="clickEffect">
                                   <p:stCondLst>
                                     <p:cond delay="0"/>
                                   </p:stCondLst>
@@ -21589,7 +21589,7 @@
                             </p:stCondLst>
                             <p:childTnLst>
                               <p:par>
-                                <p:cTn id="17" presetID="1" presetClass="entr" presetSubtype="0" fill="hold" grpId="0" nodeType="clickEffect">
+                                <p:cTn id="17" presetID="1" presetClass="entr" presetSubtype="0" fill="hold" nodeType="clickEffect">
                                   <p:stCondLst>
                                     <p:cond delay="0"/>
                                   </p:stCondLst>
@@ -21638,7 +21638,7 @@
                             </p:stCondLst>
                             <p:childTnLst>
                               <p:par>
-                                <p:cTn id="21" presetID="1" presetClass="entr" presetSubtype="0" fill="hold" grpId="0" nodeType="clickEffect">
+                                <p:cTn id="21" presetID="1" presetClass="entr" presetSubtype="0" fill="hold" nodeType="clickEffect">
                                   <p:stCondLst>
                                     <p:cond delay="0"/>
                                   </p:stCondLst>
@@ -21687,7 +21687,7 @@
                             </p:stCondLst>
                             <p:childTnLst>
                               <p:par>
-                                <p:cTn id="25" presetID="1" presetClass="entr" presetSubtype="0" fill="hold" grpId="0" nodeType="clickEffect">
+                                <p:cTn id="25" presetID="1" presetClass="entr" presetSubtype="0" fill="hold" nodeType="clickEffect">
                                   <p:stCondLst>
                                     <p:cond delay="0"/>
                                   </p:stCondLst>
@@ -24203,142 +24203,6 @@
 </file>
 
 <file path=customXml/item1.xml><?xml version="1.0" encoding="utf-8"?>
-<p:properties xmlns:p="http://schemas.microsoft.com/office/2006/metadata/properties" xmlns:xsi="http://www.w3.org/2001/XMLSchema-instance" xmlns:pc="http://schemas.microsoft.com/office/infopath/2007/PartnerControls">
-  <documentManagement>
-    <LocPublishedLinkedAssetsLookup xmlns="4873beb7-5857-4685-be1f-d57550cc96cc" xsi:nil="true"/>
-    <ApprovalStatus xmlns="4873beb7-5857-4685-be1f-d57550cc96cc">InProgress</ApprovalStatus>
-    <MarketSpecific xmlns="4873beb7-5857-4685-be1f-d57550cc96cc">false</MarketSpecific>
-    <LocComments xmlns="4873beb7-5857-4685-be1f-d57550cc96cc" xsi:nil="true"/>
-    <LocLastLocAttemptVersionTypeLookup xmlns="4873beb7-5857-4685-be1f-d57550cc96cc" xsi:nil="true"/>
-    <DirectSourceMarket xmlns="4873beb7-5857-4685-be1f-d57550cc96cc" xsi:nil="true"/>
-    <ThumbnailAssetId xmlns="4873beb7-5857-4685-be1f-d57550cc96cc" xsi:nil="true"/>
-    <PrimaryImageGen xmlns="4873beb7-5857-4685-be1f-d57550cc96cc">false</PrimaryImageGen>
-    <LocNewPublishedVersionLookup xmlns="4873beb7-5857-4685-be1f-d57550cc96cc" xsi:nil="true"/>
-    <LegacyData xmlns="4873beb7-5857-4685-be1f-d57550cc96cc" xsi:nil="true"/>
-    <LocRecommendedHandoff xmlns="4873beb7-5857-4685-be1f-d57550cc96cc" xsi:nil="true"/>
-    <BusinessGroup xmlns="4873beb7-5857-4685-be1f-d57550cc96cc" xsi:nil="true"/>
-    <BlockPublish xmlns="4873beb7-5857-4685-be1f-d57550cc96cc">false</BlockPublish>
-    <TPFriendlyName xmlns="4873beb7-5857-4685-be1f-d57550cc96cc" xsi:nil="true"/>
-    <LocOverallPublishStatusLookup xmlns="4873beb7-5857-4685-be1f-d57550cc96cc" xsi:nil="true"/>
-    <NumericId xmlns="4873beb7-5857-4685-be1f-d57550cc96cc" xsi:nil="true"/>
-    <APEditor xmlns="4873beb7-5857-4685-be1f-d57550cc96cc">
-      <UserInfo>
-        <DisplayName/>
-        <AccountId xsi:nil="true"/>
-        <AccountType/>
-      </UserInfo>
-    </APEditor>
-    <SourceTitle xmlns="4873beb7-5857-4685-be1f-d57550cc96cc" xsi:nil="true"/>
-    <OpenTemplate xmlns="4873beb7-5857-4685-be1f-d57550cc96cc">true</OpenTemplate>
-    <LocOverallLocStatusLookup xmlns="4873beb7-5857-4685-be1f-d57550cc96cc" xsi:nil="true"/>
-    <UALocComments xmlns="4873beb7-5857-4685-be1f-d57550cc96cc" xsi:nil="true"/>
-    <ParentAssetId xmlns="4873beb7-5857-4685-be1f-d57550cc96cc" xsi:nil="true"/>
-    <IntlLangReviewDate xmlns="4873beb7-5857-4685-be1f-d57550cc96cc" xsi:nil="true"/>
-    <FeatureTagsTaxHTField0 xmlns="4873beb7-5857-4685-be1f-d57550cc96cc">
-      <Terms xmlns="http://schemas.microsoft.com/office/infopath/2007/PartnerControls"/>
-    </FeatureTagsTaxHTField0>
-    <PublishStatusLookup xmlns="4873beb7-5857-4685-be1f-d57550cc96cc">
-      <Value>1345093</Value>
-    </PublishStatusLookup>
-    <Providers xmlns="4873beb7-5857-4685-be1f-d57550cc96cc" xsi:nil="true"/>
-    <MachineTranslated xmlns="4873beb7-5857-4685-be1f-d57550cc96cc">false</MachineTranslated>
-    <OriginalSourceMarket xmlns="4873beb7-5857-4685-be1f-d57550cc96cc" xsi:nil="true"/>
-    <APDescription xmlns="4873beb7-5857-4685-be1f-d57550cc96cc">This simple template design works for technology and  businesses, but it's versatile enough to use in other contexts.  It features multiple slide layouts designed for widescreen (16x9 resolution) and includes a sample SmartArt list and chart that are easily editable.</APDescription>
-    <ClipArtFilename xmlns="4873beb7-5857-4685-be1f-d57550cc96cc" xsi:nil="true"/>
-    <ContentItem xmlns="4873beb7-5857-4685-be1f-d57550cc96cc" xsi:nil="true"/>
-    <TPInstallLocation xmlns="4873beb7-5857-4685-be1f-d57550cc96cc" xsi:nil="true"/>
-    <PublishTargets xmlns="4873beb7-5857-4685-be1f-d57550cc96cc">OfficeOnlineVNext</PublishTargets>
-    <TimesCloned xmlns="4873beb7-5857-4685-be1f-d57550cc96cc" xsi:nil="true"/>
-    <AssetStart xmlns="4873beb7-5857-4685-be1f-d57550cc96cc">2011-11-26T00:30:00+00:00</AssetStart>
-    <Provider xmlns="4873beb7-5857-4685-be1f-d57550cc96cc" xsi:nil="true"/>
-    <AcquiredFrom xmlns="4873beb7-5857-4685-be1f-d57550cc96cc">Internal MS</AcquiredFrom>
-    <FriendlyTitle xmlns="4873beb7-5857-4685-be1f-d57550cc96cc" xsi:nil="true"/>
-    <LastHandOff xmlns="4873beb7-5857-4685-be1f-d57550cc96cc" xsi:nil="true"/>
-    <TPClientViewer xmlns="4873beb7-5857-4685-be1f-d57550cc96cc" xsi:nil="true"/>
-    <TemplateStatus xmlns="4873beb7-5857-4685-be1f-d57550cc96cc">Complete</TemplateStatus>
-    <Downloads xmlns="4873beb7-5857-4685-be1f-d57550cc96cc">0</Downloads>
-    <OOCacheId xmlns="4873beb7-5857-4685-be1f-d57550cc96cc" xsi:nil="true"/>
-    <IsDeleted xmlns="4873beb7-5857-4685-be1f-d57550cc96cc">false</IsDeleted>
-    <LocPublishedDependentAssetsLookup xmlns="4873beb7-5857-4685-be1f-d57550cc96cc" xsi:nil="true"/>
-    <TPExecutable xmlns="4873beb7-5857-4685-be1f-d57550cc96cc" xsi:nil="true"/>
-    <EditorialTags xmlns="4873beb7-5857-4685-be1f-d57550cc96cc" xsi:nil="true"/>
-    <SubmitterId xmlns="4873beb7-5857-4685-be1f-d57550cc96cc" xsi:nil="true"/>
-    <ApprovalLog xmlns="4873beb7-5857-4685-be1f-d57550cc96cc" xsi:nil="true"/>
-    <AssetType xmlns="4873beb7-5857-4685-be1f-d57550cc96cc">TP</AssetType>
-    <BugNumber xmlns="4873beb7-5857-4685-be1f-d57550cc96cc" xsi:nil="true"/>
-    <CSXSubmissionDate xmlns="4873beb7-5857-4685-be1f-d57550cc96cc" xsi:nil="true"/>
-    <CSXUpdate xmlns="4873beb7-5857-4685-be1f-d57550cc96cc">false</CSXUpdate>
-    <Milestone xmlns="4873beb7-5857-4685-be1f-d57550cc96cc" xsi:nil="true"/>
-    <RecommendationsModifier xmlns="4873beb7-5857-4685-be1f-d57550cc96cc" xsi:nil="true"/>
-    <OriginAsset xmlns="4873beb7-5857-4685-be1f-d57550cc96cc" xsi:nil="true"/>
-    <TPComponent xmlns="4873beb7-5857-4685-be1f-d57550cc96cc" xsi:nil="true"/>
-    <AssetId xmlns="4873beb7-5857-4685-be1f-d57550cc96cc">TP102787989</AssetId>
-    <IntlLocPriority xmlns="4873beb7-5857-4685-be1f-d57550cc96cc" xsi:nil="true"/>
-    <PolicheckWords xmlns="4873beb7-5857-4685-be1f-d57550cc96cc" xsi:nil="true"/>
-    <TPLaunchHelpLink xmlns="4873beb7-5857-4685-be1f-d57550cc96cc" xsi:nil="true"/>
-    <TPApplication xmlns="4873beb7-5857-4685-be1f-d57550cc96cc" xsi:nil="true"/>
-    <CrawlForDependencies xmlns="4873beb7-5857-4685-be1f-d57550cc96cc">false</CrawlForDependencies>
-    <HandoffToMSDN xmlns="4873beb7-5857-4685-be1f-d57550cc96cc" xsi:nil="true"/>
-    <PlannedPubDate xmlns="4873beb7-5857-4685-be1f-d57550cc96cc" xsi:nil="true"/>
-    <IntlLangReviewer xmlns="4873beb7-5857-4685-be1f-d57550cc96cc" xsi:nil="true"/>
-    <TrustLevel xmlns="4873beb7-5857-4685-be1f-d57550cc96cc">1 Microsoft Managed Content</TrustLevel>
-    <LocLastLocAttemptVersionLookup xmlns="4873beb7-5857-4685-be1f-d57550cc96cc">694266</LocLastLocAttemptVersionLookup>
-    <LocProcessedForHandoffsLookup xmlns="4873beb7-5857-4685-be1f-d57550cc96cc" xsi:nil="true"/>
-    <IsSearchable xmlns="4873beb7-5857-4685-be1f-d57550cc96cc">true</IsSearchable>
-    <TemplateTemplateType xmlns="4873beb7-5857-4685-be1f-d57550cc96cc">PowerPoint Presentation Template</TemplateTemplateType>
-    <CampaignTagsTaxHTField0 xmlns="4873beb7-5857-4685-be1f-d57550cc96cc">
-      <Terms xmlns="http://schemas.microsoft.com/office/infopath/2007/PartnerControls"/>
-    </CampaignTagsTaxHTField0>
-    <TPNamespace xmlns="4873beb7-5857-4685-be1f-d57550cc96cc" xsi:nil="true"/>
-    <LocOverallPreviewStatusLookup xmlns="4873beb7-5857-4685-be1f-d57550cc96cc" xsi:nil="true"/>
-    <TaxCatchAll xmlns="4873beb7-5857-4685-be1f-d57550cc96cc"/>
-    <Markets xmlns="4873beb7-5857-4685-be1f-d57550cc96cc"/>
-    <UAProjectedTotalWords xmlns="4873beb7-5857-4685-be1f-d57550cc96cc" xsi:nil="true"/>
-    <IntlLangReview xmlns="4873beb7-5857-4685-be1f-d57550cc96cc" xsi:nil="true"/>
-    <OutputCachingOn xmlns="4873beb7-5857-4685-be1f-d57550cc96cc">false</OutputCachingOn>
-    <AverageRating xmlns="4873beb7-5857-4685-be1f-d57550cc96cc" xsi:nil="true"/>
-    <APAuthor xmlns="4873beb7-5857-4685-be1f-d57550cc96cc">
-      <UserInfo>
-        <DisplayName>REDMOND\kristaa</DisplayName>
-        <AccountId>136</AccountId>
-        <AccountType/>
-      </UserInfo>
-    </APAuthor>
-    <LocManualTestRequired xmlns="4873beb7-5857-4685-be1f-d57550cc96cc">false</LocManualTestRequired>
-    <TPCommandLine xmlns="4873beb7-5857-4685-be1f-d57550cc96cc" xsi:nil="true"/>
-    <TPAppVersion xmlns="4873beb7-5857-4685-be1f-d57550cc96cc" xsi:nil="true"/>
-    <EditorialStatus xmlns="4873beb7-5857-4685-be1f-d57550cc96cc">Complete</EditorialStatus>
-    <LastModifiedDateTime xmlns="4873beb7-5857-4685-be1f-d57550cc96cc" xsi:nil="true"/>
-    <ScenarioTagsTaxHTField0 xmlns="4873beb7-5857-4685-be1f-d57550cc96cc">
-      <Terms xmlns="http://schemas.microsoft.com/office/infopath/2007/PartnerControls"/>
-    </ScenarioTagsTaxHTField0>
-    <LocProcessedForMarketsLookup xmlns="4873beb7-5857-4685-be1f-d57550cc96cc" xsi:nil="true"/>
-    <TPLaunchHelpLinkType xmlns="4873beb7-5857-4685-be1f-d57550cc96cc">Template</TPLaunchHelpLinkType>
-    <OriginalRelease xmlns="4873beb7-5857-4685-be1f-d57550cc96cc">15</OriginalRelease>
-    <LocalizationTagsTaxHTField0 xmlns="4873beb7-5857-4685-be1f-d57550cc96cc">
-      <Terms xmlns="http://schemas.microsoft.com/office/infopath/2007/PartnerControls"/>
-    </LocalizationTagsTaxHTField0>
-    <UACurrentWords xmlns="4873beb7-5857-4685-be1f-d57550cc96cc" xsi:nil="true"/>
-    <ArtSampleDocs xmlns="4873beb7-5857-4685-be1f-d57550cc96cc" xsi:nil="true"/>
-    <UALocRecommendation xmlns="4873beb7-5857-4685-be1f-d57550cc96cc">Localize</UALocRecommendation>
-    <Manager xmlns="4873beb7-5857-4685-be1f-d57550cc96cc" xsi:nil="true"/>
-    <LocOverallHandbackStatusLookup xmlns="4873beb7-5857-4685-be1f-d57550cc96cc" xsi:nil="true"/>
-    <ShowIn xmlns="4873beb7-5857-4685-be1f-d57550cc96cc">Show everywhere</ShowIn>
-    <UANotes xmlns="4873beb7-5857-4685-be1f-d57550cc96cc" xsi:nil="true"/>
-    <InternalTagsTaxHTField0 xmlns="4873beb7-5857-4685-be1f-d57550cc96cc">
-      <Terms xmlns="http://schemas.microsoft.com/office/infopath/2007/PartnerControls"/>
-    </InternalTagsTaxHTField0>
-    <CSXHash xmlns="4873beb7-5857-4685-be1f-d57550cc96cc" xsi:nil="true"/>
-    <VoteCount xmlns="4873beb7-5857-4685-be1f-d57550cc96cc" xsi:nil="true"/>
-    <AssetExpire xmlns="4873beb7-5857-4685-be1f-d57550cc96cc">2029-05-12T07:00:00+00:00</AssetExpire>
-    <DSATActionTaken xmlns="4873beb7-5857-4685-be1f-d57550cc96cc" xsi:nil="true"/>
-    <CSXSubmissionMarket xmlns="4873beb7-5857-4685-be1f-d57550cc96cc" xsi:nil="true"/>
-    <LocMarketGroupTiers2 xmlns="4873beb7-5857-4685-be1f-d57550cc96cc" xsi:nil="true"/>
-  </documentManagement>
-</p:properties>
-</file>
-
-<file path=customXml/item2.xml><?xml version="1.0" encoding="utf-8"?>
 <ct:contentTypeSchema xmlns:ct="http://schemas.microsoft.com/office/2006/metadata/contentType" xmlns:ma="http://schemas.microsoft.com/office/2006/metadata/properties/metaAttributes" ct:_="" ma:_="" ma:contentTypeName="TemplateFile" ma:contentTypeID="0x0101006EDDDB5EE6D98C44930B742096920B300400F5B6D36B3EF94B4E9A635CDF2A18F5B8" ma:contentTypeVersion="72" ma:contentTypeDescription="Create a new document." ma:contentTypeScope="" ma:versionID="a23e56308344d904b51738559c3d67c9">
   <xsd:schema xmlns:xsd="http://www.w3.org/2001/XMLSchema" xmlns:xs="http://www.w3.org/2001/XMLSchema" xmlns:p="http://schemas.microsoft.com/office/2006/metadata/properties" xmlns:ns2="4873beb7-5857-4685-be1f-d57550cc96cc" targetNamespace="http://schemas.microsoft.com/office/2006/metadata/properties" ma:root="true" ma:fieldsID="cd0908cc4600e77bf5da051303e00c8d" ns2:_="">
     <xsd:import namespace="4873beb7-5857-4685-be1f-d57550cc96cc"/>
@@ -25378,7 +25242,7 @@
 </ct:contentTypeSchema>
 </file>
 
-<file path=customXml/item3.xml><?xml version="1.0" encoding="utf-8"?>
+<file path=customXml/item2.xml><?xml version="1.0" encoding="utf-8"?>
 <?mso-contentType ?>
 <FormTemplates xmlns="http://schemas.microsoft.com/sharepoint/v3/contenttype/forms">
   <Display>DocumentLibraryForm</Display>
@@ -25387,17 +25251,143 @@
 </FormTemplates>
 </file>
 
-<file path=customXml/itemProps1.xml><?xml version="1.0" encoding="utf-8"?>
-<ds:datastoreItem xmlns:ds="http://schemas.openxmlformats.org/officeDocument/2006/customXml" ds:itemID="{60C67BEE-D13F-4BD2-98A5-34D8A0977F68}">
-  <ds:schemaRefs>
-    <ds:schemaRef ds:uri="http://schemas.microsoft.com/office/2006/metadata/properties"/>
-    <ds:schemaRef ds:uri="http://schemas.microsoft.com/office/infopath/2007/PartnerControls"/>
-    <ds:schemaRef ds:uri="4873beb7-5857-4685-be1f-d57550cc96cc"/>
-  </ds:schemaRefs>
-</ds:datastoreItem>
+<file path=customXml/item3.xml><?xml version="1.0" encoding="utf-8"?>
+<p:properties xmlns:p="http://schemas.microsoft.com/office/2006/metadata/properties" xmlns:xsi="http://www.w3.org/2001/XMLSchema-instance" xmlns:pc="http://schemas.microsoft.com/office/infopath/2007/PartnerControls">
+  <documentManagement>
+    <LocPublishedLinkedAssetsLookup xmlns="4873beb7-5857-4685-be1f-d57550cc96cc" xsi:nil="true"/>
+    <ApprovalStatus xmlns="4873beb7-5857-4685-be1f-d57550cc96cc">InProgress</ApprovalStatus>
+    <MarketSpecific xmlns="4873beb7-5857-4685-be1f-d57550cc96cc">false</MarketSpecific>
+    <LocComments xmlns="4873beb7-5857-4685-be1f-d57550cc96cc" xsi:nil="true"/>
+    <LocLastLocAttemptVersionTypeLookup xmlns="4873beb7-5857-4685-be1f-d57550cc96cc" xsi:nil="true"/>
+    <DirectSourceMarket xmlns="4873beb7-5857-4685-be1f-d57550cc96cc" xsi:nil="true"/>
+    <ThumbnailAssetId xmlns="4873beb7-5857-4685-be1f-d57550cc96cc" xsi:nil="true"/>
+    <PrimaryImageGen xmlns="4873beb7-5857-4685-be1f-d57550cc96cc">false</PrimaryImageGen>
+    <LocNewPublishedVersionLookup xmlns="4873beb7-5857-4685-be1f-d57550cc96cc" xsi:nil="true"/>
+    <LegacyData xmlns="4873beb7-5857-4685-be1f-d57550cc96cc" xsi:nil="true"/>
+    <LocRecommendedHandoff xmlns="4873beb7-5857-4685-be1f-d57550cc96cc" xsi:nil="true"/>
+    <BusinessGroup xmlns="4873beb7-5857-4685-be1f-d57550cc96cc" xsi:nil="true"/>
+    <BlockPublish xmlns="4873beb7-5857-4685-be1f-d57550cc96cc">false</BlockPublish>
+    <TPFriendlyName xmlns="4873beb7-5857-4685-be1f-d57550cc96cc" xsi:nil="true"/>
+    <LocOverallPublishStatusLookup xmlns="4873beb7-5857-4685-be1f-d57550cc96cc" xsi:nil="true"/>
+    <NumericId xmlns="4873beb7-5857-4685-be1f-d57550cc96cc" xsi:nil="true"/>
+    <APEditor xmlns="4873beb7-5857-4685-be1f-d57550cc96cc">
+      <UserInfo>
+        <DisplayName/>
+        <AccountId xsi:nil="true"/>
+        <AccountType/>
+      </UserInfo>
+    </APEditor>
+    <SourceTitle xmlns="4873beb7-5857-4685-be1f-d57550cc96cc" xsi:nil="true"/>
+    <OpenTemplate xmlns="4873beb7-5857-4685-be1f-d57550cc96cc">true</OpenTemplate>
+    <LocOverallLocStatusLookup xmlns="4873beb7-5857-4685-be1f-d57550cc96cc" xsi:nil="true"/>
+    <UALocComments xmlns="4873beb7-5857-4685-be1f-d57550cc96cc" xsi:nil="true"/>
+    <ParentAssetId xmlns="4873beb7-5857-4685-be1f-d57550cc96cc" xsi:nil="true"/>
+    <IntlLangReviewDate xmlns="4873beb7-5857-4685-be1f-d57550cc96cc" xsi:nil="true"/>
+    <FeatureTagsTaxHTField0 xmlns="4873beb7-5857-4685-be1f-d57550cc96cc">
+      <Terms xmlns="http://schemas.microsoft.com/office/infopath/2007/PartnerControls"/>
+    </FeatureTagsTaxHTField0>
+    <PublishStatusLookup xmlns="4873beb7-5857-4685-be1f-d57550cc96cc">
+      <Value>1345093</Value>
+    </PublishStatusLookup>
+    <Providers xmlns="4873beb7-5857-4685-be1f-d57550cc96cc" xsi:nil="true"/>
+    <MachineTranslated xmlns="4873beb7-5857-4685-be1f-d57550cc96cc">false</MachineTranslated>
+    <OriginalSourceMarket xmlns="4873beb7-5857-4685-be1f-d57550cc96cc" xsi:nil="true"/>
+    <APDescription xmlns="4873beb7-5857-4685-be1f-d57550cc96cc">This simple template design works for technology and  businesses, but it's versatile enough to use in other contexts.  It features multiple slide layouts designed for widescreen (16x9 resolution) and includes a sample SmartArt list and chart that are easily editable.</APDescription>
+    <ClipArtFilename xmlns="4873beb7-5857-4685-be1f-d57550cc96cc" xsi:nil="true"/>
+    <ContentItem xmlns="4873beb7-5857-4685-be1f-d57550cc96cc" xsi:nil="true"/>
+    <TPInstallLocation xmlns="4873beb7-5857-4685-be1f-d57550cc96cc" xsi:nil="true"/>
+    <PublishTargets xmlns="4873beb7-5857-4685-be1f-d57550cc96cc">OfficeOnlineVNext</PublishTargets>
+    <TimesCloned xmlns="4873beb7-5857-4685-be1f-d57550cc96cc" xsi:nil="true"/>
+    <AssetStart xmlns="4873beb7-5857-4685-be1f-d57550cc96cc">2011-11-26T00:30:00+00:00</AssetStart>
+    <Provider xmlns="4873beb7-5857-4685-be1f-d57550cc96cc" xsi:nil="true"/>
+    <AcquiredFrom xmlns="4873beb7-5857-4685-be1f-d57550cc96cc">Internal MS</AcquiredFrom>
+    <FriendlyTitle xmlns="4873beb7-5857-4685-be1f-d57550cc96cc" xsi:nil="true"/>
+    <LastHandOff xmlns="4873beb7-5857-4685-be1f-d57550cc96cc" xsi:nil="true"/>
+    <TPClientViewer xmlns="4873beb7-5857-4685-be1f-d57550cc96cc" xsi:nil="true"/>
+    <TemplateStatus xmlns="4873beb7-5857-4685-be1f-d57550cc96cc">Complete</TemplateStatus>
+    <Downloads xmlns="4873beb7-5857-4685-be1f-d57550cc96cc">0</Downloads>
+    <OOCacheId xmlns="4873beb7-5857-4685-be1f-d57550cc96cc" xsi:nil="true"/>
+    <IsDeleted xmlns="4873beb7-5857-4685-be1f-d57550cc96cc">false</IsDeleted>
+    <LocPublishedDependentAssetsLookup xmlns="4873beb7-5857-4685-be1f-d57550cc96cc" xsi:nil="true"/>
+    <TPExecutable xmlns="4873beb7-5857-4685-be1f-d57550cc96cc" xsi:nil="true"/>
+    <EditorialTags xmlns="4873beb7-5857-4685-be1f-d57550cc96cc" xsi:nil="true"/>
+    <SubmitterId xmlns="4873beb7-5857-4685-be1f-d57550cc96cc" xsi:nil="true"/>
+    <ApprovalLog xmlns="4873beb7-5857-4685-be1f-d57550cc96cc" xsi:nil="true"/>
+    <AssetType xmlns="4873beb7-5857-4685-be1f-d57550cc96cc">TP</AssetType>
+    <BugNumber xmlns="4873beb7-5857-4685-be1f-d57550cc96cc" xsi:nil="true"/>
+    <CSXSubmissionDate xmlns="4873beb7-5857-4685-be1f-d57550cc96cc" xsi:nil="true"/>
+    <CSXUpdate xmlns="4873beb7-5857-4685-be1f-d57550cc96cc">false</CSXUpdate>
+    <Milestone xmlns="4873beb7-5857-4685-be1f-d57550cc96cc" xsi:nil="true"/>
+    <RecommendationsModifier xmlns="4873beb7-5857-4685-be1f-d57550cc96cc" xsi:nil="true"/>
+    <OriginAsset xmlns="4873beb7-5857-4685-be1f-d57550cc96cc" xsi:nil="true"/>
+    <TPComponent xmlns="4873beb7-5857-4685-be1f-d57550cc96cc" xsi:nil="true"/>
+    <AssetId xmlns="4873beb7-5857-4685-be1f-d57550cc96cc">TP102787989</AssetId>
+    <IntlLocPriority xmlns="4873beb7-5857-4685-be1f-d57550cc96cc" xsi:nil="true"/>
+    <PolicheckWords xmlns="4873beb7-5857-4685-be1f-d57550cc96cc" xsi:nil="true"/>
+    <TPLaunchHelpLink xmlns="4873beb7-5857-4685-be1f-d57550cc96cc" xsi:nil="true"/>
+    <TPApplication xmlns="4873beb7-5857-4685-be1f-d57550cc96cc" xsi:nil="true"/>
+    <CrawlForDependencies xmlns="4873beb7-5857-4685-be1f-d57550cc96cc">false</CrawlForDependencies>
+    <HandoffToMSDN xmlns="4873beb7-5857-4685-be1f-d57550cc96cc" xsi:nil="true"/>
+    <PlannedPubDate xmlns="4873beb7-5857-4685-be1f-d57550cc96cc" xsi:nil="true"/>
+    <IntlLangReviewer xmlns="4873beb7-5857-4685-be1f-d57550cc96cc" xsi:nil="true"/>
+    <TrustLevel xmlns="4873beb7-5857-4685-be1f-d57550cc96cc">1 Microsoft Managed Content</TrustLevel>
+    <LocLastLocAttemptVersionLookup xmlns="4873beb7-5857-4685-be1f-d57550cc96cc">694266</LocLastLocAttemptVersionLookup>
+    <LocProcessedForHandoffsLookup xmlns="4873beb7-5857-4685-be1f-d57550cc96cc" xsi:nil="true"/>
+    <IsSearchable xmlns="4873beb7-5857-4685-be1f-d57550cc96cc">true</IsSearchable>
+    <TemplateTemplateType xmlns="4873beb7-5857-4685-be1f-d57550cc96cc">PowerPoint Presentation Template</TemplateTemplateType>
+    <CampaignTagsTaxHTField0 xmlns="4873beb7-5857-4685-be1f-d57550cc96cc">
+      <Terms xmlns="http://schemas.microsoft.com/office/infopath/2007/PartnerControls"/>
+    </CampaignTagsTaxHTField0>
+    <TPNamespace xmlns="4873beb7-5857-4685-be1f-d57550cc96cc" xsi:nil="true"/>
+    <LocOverallPreviewStatusLookup xmlns="4873beb7-5857-4685-be1f-d57550cc96cc" xsi:nil="true"/>
+    <TaxCatchAll xmlns="4873beb7-5857-4685-be1f-d57550cc96cc"/>
+    <Markets xmlns="4873beb7-5857-4685-be1f-d57550cc96cc"/>
+    <UAProjectedTotalWords xmlns="4873beb7-5857-4685-be1f-d57550cc96cc" xsi:nil="true"/>
+    <IntlLangReview xmlns="4873beb7-5857-4685-be1f-d57550cc96cc" xsi:nil="true"/>
+    <OutputCachingOn xmlns="4873beb7-5857-4685-be1f-d57550cc96cc">false</OutputCachingOn>
+    <AverageRating xmlns="4873beb7-5857-4685-be1f-d57550cc96cc" xsi:nil="true"/>
+    <APAuthor xmlns="4873beb7-5857-4685-be1f-d57550cc96cc">
+      <UserInfo>
+        <DisplayName>REDMOND\kristaa</DisplayName>
+        <AccountId>136</AccountId>
+        <AccountType/>
+      </UserInfo>
+    </APAuthor>
+    <LocManualTestRequired xmlns="4873beb7-5857-4685-be1f-d57550cc96cc">false</LocManualTestRequired>
+    <TPCommandLine xmlns="4873beb7-5857-4685-be1f-d57550cc96cc" xsi:nil="true"/>
+    <TPAppVersion xmlns="4873beb7-5857-4685-be1f-d57550cc96cc" xsi:nil="true"/>
+    <EditorialStatus xmlns="4873beb7-5857-4685-be1f-d57550cc96cc">Complete</EditorialStatus>
+    <LastModifiedDateTime xmlns="4873beb7-5857-4685-be1f-d57550cc96cc" xsi:nil="true"/>
+    <ScenarioTagsTaxHTField0 xmlns="4873beb7-5857-4685-be1f-d57550cc96cc">
+      <Terms xmlns="http://schemas.microsoft.com/office/infopath/2007/PartnerControls"/>
+    </ScenarioTagsTaxHTField0>
+    <LocProcessedForMarketsLookup xmlns="4873beb7-5857-4685-be1f-d57550cc96cc" xsi:nil="true"/>
+    <TPLaunchHelpLinkType xmlns="4873beb7-5857-4685-be1f-d57550cc96cc">Template</TPLaunchHelpLinkType>
+    <OriginalRelease xmlns="4873beb7-5857-4685-be1f-d57550cc96cc">15</OriginalRelease>
+    <LocalizationTagsTaxHTField0 xmlns="4873beb7-5857-4685-be1f-d57550cc96cc">
+      <Terms xmlns="http://schemas.microsoft.com/office/infopath/2007/PartnerControls"/>
+    </LocalizationTagsTaxHTField0>
+    <UACurrentWords xmlns="4873beb7-5857-4685-be1f-d57550cc96cc" xsi:nil="true"/>
+    <ArtSampleDocs xmlns="4873beb7-5857-4685-be1f-d57550cc96cc" xsi:nil="true"/>
+    <UALocRecommendation xmlns="4873beb7-5857-4685-be1f-d57550cc96cc">Localize</UALocRecommendation>
+    <Manager xmlns="4873beb7-5857-4685-be1f-d57550cc96cc" xsi:nil="true"/>
+    <LocOverallHandbackStatusLookup xmlns="4873beb7-5857-4685-be1f-d57550cc96cc" xsi:nil="true"/>
+    <ShowIn xmlns="4873beb7-5857-4685-be1f-d57550cc96cc">Show everywhere</ShowIn>
+    <UANotes xmlns="4873beb7-5857-4685-be1f-d57550cc96cc" xsi:nil="true"/>
+    <InternalTagsTaxHTField0 xmlns="4873beb7-5857-4685-be1f-d57550cc96cc">
+      <Terms xmlns="http://schemas.microsoft.com/office/infopath/2007/PartnerControls"/>
+    </InternalTagsTaxHTField0>
+    <CSXHash xmlns="4873beb7-5857-4685-be1f-d57550cc96cc" xsi:nil="true"/>
+    <VoteCount xmlns="4873beb7-5857-4685-be1f-d57550cc96cc" xsi:nil="true"/>
+    <AssetExpire xmlns="4873beb7-5857-4685-be1f-d57550cc96cc">2029-05-12T07:00:00+00:00</AssetExpire>
+    <DSATActionTaken xmlns="4873beb7-5857-4685-be1f-d57550cc96cc" xsi:nil="true"/>
+    <CSXSubmissionMarket xmlns="4873beb7-5857-4685-be1f-d57550cc96cc" xsi:nil="true"/>
+    <LocMarketGroupTiers2 xmlns="4873beb7-5857-4685-be1f-d57550cc96cc" xsi:nil="true"/>
+  </documentManagement>
+</p:properties>
 </file>
 
-<file path=customXml/itemProps2.xml><?xml version="1.0" encoding="utf-8"?>
+<file path=customXml/itemProps1.xml><?xml version="1.0" encoding="utf-8"?>
 <ds:datastoreItem xmlns:ds="http://schemas.openxmlformats.org/officeDocument/2006/customXml" ds:itemID="{A09BF4D4-EF60-4196-BFC3-9462D607978C}">
   <ds:schemaRefs>
     <ds:schemaRef ds:uri="http://schemas.microsoft.com/office/2006/metadata/contentType"/>
@@ -25415,10 +25405,20 @@
 </ds:datastoreItem>
 </file>
 
-<file path=customXml/itemProps3.xml><?xml version="1.0" encoding="utf-8"?>
+<file path=customXml/itemProps2.xml><?xml version="1.0" encoding="utf-8"?>
 <ds:datastoreItem xmlns:ds="http://schemas.openxmlformats.org/officeDocument/2006/customXml" ds:itemID="{3836F65B-1B07-41EE-A0E8-BC6EF3855225}">
   <ds:schemaRefs>
     <ds:schemaRef ds:uri="http://schemas.microsoft.com/sharepoint/v3/contenttype/forms"/>
   </ds:schemaRefs>
 </ds:datastoreItem>
+</file>
+
+<file path=customXml/itemProps3.xml><?xml version="1.0" encoding="utf-8"?>
+<ds:datastoreItem xmlns:ds="http://schemas.openxmlformats.org/officeDocument/2006/customXml" ds:itemID="{60C67BEE-D13F-4BD2-98A5-34D8A0977F68}">
+  <ds:schemaRefs>
+    <ds:schemaRef ds:uri="http://schemas.microsoft.com/office/2006/metadata/properties"/>
+    <ds:schemaRef ds:uri="http://schemas.microsoft.com/office/infopath/2007/PartnerControls"/>
+    <ds:schemaRef ds:uri="4873beb7-5857-4685-be1f-d57550cc96cc"/>
+  </ds:schemaRefs>
+</ds:datastoreItem>
 </file>
</xml_diff>